<commit_message>
updated icon set and logo (missed saving before pushing last time)
</commit_message>
<xml_diff>
--- a/doc/Logo and icons.pptx
+++ b/doc/Logo and icons.pptx
@@ -3702,88 +3702,6 @@
           <a:chExt cx="0" cy="0"/>
         </a:xfrm>
       </p:grpSpPr>
-      <p:pic>
-        <p:nvPicPr>
-          <p:cNvPr id="2050" name="Picture 2" descr="http://shareknowledge-lms.com/images/csk/dop/powerpoint-icon.jpg"/>
-          <p:cNvPicPr>
-            <a:picLocks noChangeAspect="1" noChangeArrowheads="1"/>
-          </p:cNvPicPr>
-          <p:nvPr/>
-        </p:nvPicPr>
-        <p:blipFill>
-          <a:blip r:embed="rId3">
-            <a:extLst>
-              <a:ext uri="{28A0092B-C50C-407E-A947-70E740481C1C}">
-                <a14:useLocalDpi xmlns:a14="http://schemas.microsoft.com/office/drawing/2010/main" val="0"/>
-              </a:ext>
-            </a:extLst>
-          </a:blip>
-          <a:srcRect/>
-          <a:stretch>
-            <a:fillRect/>
-          </a:stretch>
-        </p:blipFill>
-        <p:spPr bwMode="auto">
-          <a:xfrm>
-            <a:off x="609600" y="519535"/>
-            <a:ext cx="1752600" cy="1752602"/>
-          </a:xfrm>
-          <a:prstGeom prst="rect">
-            <a:avLst/>
-          </a:prstGeom>
-          <a:noFill/>
-          <a:extLst>
-            <a:ext uri="{909E8E84-426E-40DD-AFC4-6F175D3DCCD1}">
-              <a14:hiddenFill xmlns:a14="http://schemas.microsoft.com/office/drawing/2010/main">
-                <a:solidFill>
-                  <a:srgbClr val="FFFFFF"/>
-                </a:solidFill>
-              </a14:hiddenFill>
-            </a:ext>
-          </a:extLst>
-        </p:spPr>
-      </p:pic>
-      <p:pic>
-        <p:nvPicPr>
-          <p:cNvPr id="27" name="Picture 2" descr="http://1.bp.blogspot.com/-QeYY0Vv33hw/TdDA1-FTuLI/AAAAAAAAAOM/tzWBS1Mrvhs/s1600/ppt_logo.png"/>
-          <p:cNvPicPr>
-            <a:picLocks noChangeAspect="1" noChangeArrowheads="1"/>
-          </p:cNvPicPr>
-          <p:nvPr/>
-        </p:nvPicPr>
-        <p:blipFill>
-          <a:blip r:embed="rId4">
-            <a:extLst>
-              <a:ext uri="{28A0092B-C50C-407E-A947-70E740481C1C}">
-                <a14:useLocalDpi xmlns:a14="http://schemas.microsoft.com/office/drawing/2010/main" val="0"/>
-              </a:ext>
-            </a:extLst>
-          </a:blip>
-          <a:srcRect/>
-          <a:stretch>
-            <a:fillRect/>
-          </a:stretch>
-        </p:blipFill>
-        <p:spPr bwMode="auto">
-          <a:xfrm>
-            <a:off x="2667000" y="290936"/>
-            <a:ext cx="2209800" cy="2209800"/>
-          </a:xfrm>
-          <a:prstGeom prst="rect">
-            <a:avLst/>
-          </a:prstGeom>
-          <a:noFill/>
-          <a:extLst>
-            <a:ext uri="{909E8E84-426E-40DD-AFC4-6F175D3DCCD1}">
-              <a14:hiddenFill xmlns:a14="http://schemas.microsoft.com/office/drawing/2010/main">
-                <a:solidFill>
-                  <a:srgbClr val="FFFFFF"/>
-                </a:solidFill>
-              </a14:hiddenFill>
-            </a:ext>
-          </a:extLst>
-        </p:spPr>
-      </p:pic>
       <p:grpSp>
         <p:nvGrpSpPr>
           <p:cNvPr id="25" name="Group 24"/>
@@ -3792,7 +3710,7 @@
         </p:nvGrpSpPr>
         <p:grpSpPr>
           <a:xfrm>
-            <a:off x="372178" y="3601880"/>
+            <a:off x="372178" y="1815259"/>
             <a:ext cx="8652779" cy="2931548"/>
             <a:chOff x="372178" y="3601880"/>
             <a:chExt cx="8652779" cy="2931548"/>

</xml_diff>

<commit_message>
refined icons to make them more visible
</commit_message>
<xml_diff>
--- a/doc/Logo and icons.pptx
+++ b/doc/Logo and icons.pptx
@@ -18,27 +18,27 @@
   <p:notesSz cx="6858000" cy="9144000"/>
   <p:embeddedFontLst>
     <p:embeddedFont>
+      <p:font typeface="Gill Sans Ultra Bold" pitchFamily="34" charset="0"/>
+      <p:regular r:id="rId8"/>
+    </p:embeddedFont>
+    <p:embeddedFont>
+      <p:font typeface="Rockwell Extra Bold" pitchFamily="18" charset="0"/>
+      <p:bold r:id="rId9"/>
+    </p:embeddedFont>
+    <p:embeddedFont>
       <p:font typeface="Calibri" pitchFamily="34" charset="0"/>
-      <p:regular r:id="rId8"/>
-      <p:bold r:id="rId9"/>
-      <p:italic r:id="rId10"/>
-      <p:boldItalic r:id="rId11"/>
+      <p:regular r:id="rId10"/>
+      <p:bold r:id="rId11"/>
+      <p:italic r:id="rId12"/>
+      <p:boldItalic r:id="rId13"/>
     </p:embeddedFont>
     <p:embeddedFont>
       <p:font typeface="Franklin Gothic Demi" pitchFamily="34" charset="0"/>
-      <p:regular r:id="rId12"/>
-      <p:italic r:id="rId13"/>
+      <p:regular r:id="rId14"/>
+      <p:italic r:id="rId15"/>
     </p:embeddedFont>
     <p:embeddedFont>
       <p:font typeface="Arial Black" pitchFamily="34" charset="0"/>
-      <p:bold r:id="rId14"/>
-    </p:embeddedFont>
-    <p:embeddedFont>
-      <p:font typeface="Gill Sans Ultra Bold" pitchFamily="34" charset="0"/>
-      <p:regular r:id="rId15"/>
-    </p:embeddedFont>
-    <p:embeddedFont>
-      <p:font typeface="Rockwell Extra Bold" pitchFamily="18" charset="0"/>
       <p:bold r:id="rId16"/>
     </p:embeddedFont>
   </p:embeddedFontLst>
@@ -222,7 +222,7 @@
           <a:p>
             <a:fld id="{6699ACB9-486C-4D62-A3A7-AF98E13EFDA3}" type="datetimeFigureOut">
               <a:rPr lang="en-US" smtClean="0"/>
-              <a:t>11/28/2013</a:t>
+              <a:t>11/29/2013</a:t>
             </a:fld>
             <a:endParaRPr lang="en-US"/>
           </a:p>
@@ -924,7 +924,7 @@
             <a:fld id="{1D8BD707-D9CF-40AE-B4C6-C98DA3205C09}" type="datetimeFigureOut">
               <a:rPr lang="en-US" smtClean="0"/>
               <a:pPr/>
-              <a:t>11/28/2013</a:t>
+              <a:t>11/29/2013</a:t>
             </a:fld>
             <a:endParaRPr lang="en-US"/>
           </a:p>
@@ -1091,7 +1091,7 @@
             <a:fld id="{1D8BD707-D9CF-40AE-B4C6-C98DA3205C09}" type="datetimeFigureOut">
               <a:rPr lang="en-US" smtClean="0"/>
               <a:pPr/>
-              <a:t>11/28/2013</a:t>
+              <a:t>11/29/2013</a:t>
             </a:fld>
             <a:endParaRPr lang="en-US"/>
           </a:p>
@@ -1268,7 +1268,7 @@
             <a:fld id="{1D8BD707-D9CF-40AE-B4C6-C98DA3205C09}" type="datetimeFigureOut">
               <a:rPr lang="en-US" smtClean="0"/>
               <a:pPr/>
-              <a:t>11/28/2013</a:t>
+              <a:t>11/29/2013</a:t>
             </a:fld>
             <a:endParaRPr lang="en-US"/>
           </a:p>
@@ -1435,7 +1435,7 @@
             <a:fld id="{1D8BD707-D9CF-40AE-B4C6-C98DA3205C09}" type="datetimeFigureOut">
               <a:rPr lang="en-US" smtClean="0"/>
               <a:pPr/>
-              <a:t>11/28/2013</a:t>
+              <a:t>11/29/2013</a:t>
             </a:fld>
             <a:endParaRPr lang="en-US"/>
           </a:p>
@@ -1678,7 +1678,7 @@
             <a:fld id="{1D8BD707-D9CF-40AE-B4C6-C98DA3205C09}" type="datetimeFigureOut">
               <a:rPr lang="en-US" smtClean="0"/>
               <a:pPr/>
-              <a:t>11/28/2013</a:t>
+              <a:t>11/29/2013</a:t>
             </a:fld>
             <a:endParaRPr lang="en-US"/>
           </a:p>
@@ -1963,7 +1963,7 @@
             <a:fld id="{1D8BD707-D9CF-40AE-B4C6-C98DA3205C09}" type="datetimeFigureOut">
               <a:rPr lang="en-US" smtClean="0"/>
               <a:pPr/>
-              <a:t>11/28/2013</a:t>
+              <a:t>11/29/2013</a:t>
             </a:fld>
             <a:endParaRPr lang="en-US"/>
           </a:p>
@@ -2382,7 +2382,7 @@
             <a:fld id="{1D8BD707-D9CF-40AE-B4C6-C98DA3205C09}" type="datetimeFigureOut">
               <a:rPr lang="en-US" smtClean="0"/>
               <a:pPr/>
-              <a:t>11/28/2013</a:t>
+              <a:t>11/29/2013</a:t>
             </a:fld>
             <a:endParaRPr lang="en-US"/>
           </a:p>
@@ -2497,7 +2497,7 @@
             <a:fld id="{1D8BD707-D9CF-40AE-B4C6-C98DA3205C09}" type="datetimeFigureOut">
               <a:rPr lang="en-US" smtClean="0"/>
               <a:pPr/>
-              <a:t>11/28/2013</a:t>
+              <a:t>11/29/2013</a:t>
             </a:fld>
             <a:endParaRPr lang="en-US"/>
           </a:p>
@@ -2589,7 +2589,7 @@
             <a:fld id="{1D8BD707-D9CF-40AE-B4C6-C98DA3205C09}" type="datetimeFigureOut">
               <a:rPr lang="en-US" smtClean="0"/>
               <a:pPr/>
-              <a:t>11/28/2013</a:t>
+              <a:t>11/29/2013</a:t>
             </a:fld>
             <a:endParaRPr lang="en-US"/>
           </a:p>
@@ -2863,7 +2863,7 @@
             <a:fld id="{1D8BD707-D9CF-40AE-B4C6-C98DA3205C09}" type="datetimeFigureOut">
               <a:rPr lang="en-US" smtClean="0"/>
               <a:pPr/>
-              <a:t>11/28/2013</a:t>
+              <a:t>11/29/2013</a:t>
             </a:fld>
             <a:endParaRPr lang="en-US"/>
           </a:p>
@@ -3113,7 +3113,7 @@
             <a:fld id="{1D8BD707-D9CF-40AE-B4C6-C98DA3205C09}" type="datetimeFigureOut">
               <a:rPr lang="en-US" smtClean="0"/>
               <a:pPr/>
-              <a:t>11/28/2013</a:t>
+              <a:t>11/29/2013</a:t>
             </a:fld>
             <a:endParaRPr lang="en-US"/>
           </a:p>
@@ -3323,7 +3323,7 @@
             <a:fld id="{1D8BD707-D9CF-40AE-B4C6-C98DA3205C09}" type="datetimeFigureOut">
               <a:rPr lang="en-US" smtClean="0"/>
               <a:pPr/>
-              <a:t>11/28/2013</a:t>
+              <a:t>11/29/2013</a:t>
             </a:fld>
             <a:endParaRPr lang="en-US"/>
           </a:p>
@@ -6217,11 +6217,11 @@
   <p:clrMapOvr>
     <a:masterClrMapping/>
   </p:clrMapOvr>
-  <mc:AlternateContent xmlns:mc="http://schemas.openxmlformats.org/markup-compatibility/2006">
-    <mc:Choice xmlns:p14="http://schemas.microsoft.com/office/powerpoint/2010/main" Requires="p14">
+  <mc:AlternateContent xmlns:mc="http://schemas.openxmlformats.org/markup-compatibility/2006" xmlns:p14="http://schemas.microsoft.com/office/powerpoint/2010/main">
+    <mc:Choice Requires="p14">
       <p:transition spd="slow" p14:dur="2000"/>
     </mc:Choice>
-    <mc:Fallback>
+    <mc:Fallback xmlns="">
       <p:transition spd="slow"/>
     </mc:Fallback>
   </mc:AlternateContent>
@@ -7387,11 +7387,11 @@
   <p:clrMapOvr>
     <a:masterClrMapping/>
   </p:clrMapOvr>
-  <mc:AlternateContent xmlns:mc="http://schemas.openxmlformats.org/markup-compatibility/2006">
-    <mc:Choice xmlns:p14="http://schemas.microsoft.com/office/powerpoint/2010/main" Requires="p14">
+  <mc:AlternateContent xmlns:mc="http://schemas.openxmlformats.org/markup-compatibility/2006" xmlns:p14="http://schemas.microsoft.com/office/powerpoint/2010/main">
+    <mc:Choice Requires="p14">
       <p:transition spd="slow" p14:dur="2000"/>
     </mc:Choice>
-    <mc:Fallback>
+    <mc:Fallback xmlns="">
       <p:transition spd="slow"/>
     </mc:Fallback>
   </mc:AlternateContent>
@@ -7620,838 +7620,50 @@
           </p:txBody>
         </p:sp>
       </p:grpSp>
-      <p:grpSp>
-        <p:nvGrpSpPr>
-          <p:cNvPr id="89" name="Group 88"/>
-          <p:cNvGrpSpPr/>
+      <p:sp>
+        <p:nvSpPr>
+          <p:cNvPr id="72" name="Rectangle 71"/>
+          <p:cNvSpPr/>
           <p:nvPr/>
-        </p:nvGrpSpPr>
-        <p:grpSpPr>
+        </p:nvSpPr>
+        <p:spPr>
           <a:xfrm>
-            <a:off x="152400" y="2357870"/>
+            <a:off x="403062" y="3324203"/>
             <a:ext cx="838200" cy="838200"/>
-            <a:chOff x="152400" y="2357870"/>
-            <a:chExt cx="838200" cy="838200"/>
           </a:xfrm>
-        </p:grpSpPr>
-        <p:sp>
-          <p:nvSpPr>
-            <p:cNvPr id="15" name="Rectangle 14"/>
-            <p:cNvSpPr/>
-            <p:nvPr/>
-          </p:nvSpPr>
-          <p:spPr>
-            <a:xfrm>
-              <a:off x="169219" y="2417330"/>
-              <a:ext cx="504000" cy="324000"/>
-            </a:xfrm>
-            <a:prstGeom prst="rect">
-              <a:avLst/>
-            </a:prstGeom>
-            <a:solidFill>
-              <a:schemeClr val="accent6"/>
-            </a:solidFill>
-            <a:ln>
-              <a:solidFill>
-                <a:schemeClr val="bg1"/>
-              </a:solidFill>
-            </a:ln>
-          </p:spPr>
-          <p:style>
-            <a:lnRef idx="2">
-              <a:schemeClr val="accent1">
-                <a:shade val="50000"/>
-              </a:schemeClr>
-            </a:lnRef>
-            <a:fillRef idx="1">
-              <a:schemeClr val="accent1"/>
-            </a:fillRef>
-            <a:effectRef idx="0">
-              <a:schemeClr val="accent1"/>
-            </a:effectRef>
-            <a:fontRef idx="minor">
-              <a:schemeClr val="lt1"/>
-            </a:fontRef>
-          </p:style>
-          <p:txBody>
-            <a:bodyPr rtlCol="0" anchor="ctr"/>
-            <a:lstStyle/>
-            <a:p>
-              <a:pPr algn="ctr"/>
-              <a:endParaRPr lang="en-US"/>
-            </a:p>
-          </p:txBody>
-        </p:sp>
-        <p:sp>
-          <p:nvSpPr>
-            <p:cNvPr id="16" name="Rectangle 15"/>
-            <p:cNvSpPr/>
-            <p:nvPr/>
-          </p:nvSpPr>
-          <p:spPr>
-            <a:xfrm rot="20725682">
-              <a:off x="292174" y="2610071"/>
-              <a:ext cx="504000" cy="324000"/>
-            </a:xfrm>
-            <a:prstGeom prst="rect">
-              <a:avLst/>
-            </a:prstGeom>
-            <a:solidFill>
-              <a:srgbClr val="0070C0"/>
-            </a:solidFill>
-            <a:ln>
-              <a:solidFill>
-                <a:schemeClr val="bg1"/>
-              </a:solidFill>
-            </a:ln>
-          </p:spPr>
-          <p:style>
-            <a:lnRef idx="2">
-              <a:schemeClr val="accent1">
-                <a:shade val="50000"/>
-              </a:schemeClr>
-            </a:lnRef>
-            <a:fillRef idx="1">
-              <a:schemeClr val="accent1"/>
-            </a:fillRef>
-            <a:effectRef idx="0">
-              <a:schemeClr val="accent1"/>
-            </a:effectRef>
-            <a:fontRef idx="minor">
-              <a:schemeClr val="lt1"/>
-            </a:fontRef>
-          </p:style>
-          <p:txBody>
-            <a:bodyPr rtlCol="0" anchor="ctr"/>
-            <a:lstStyle/>
-            <a:p>
-              <a:pPr algn="ctr"/>
-              <a:endParaRPr lang="en-US"/>
-            </a:p>
-          </p:txBody>
-        </p:sp>
-        <p:sp>
-          <p:nvSpPr>
-            <p:cNvPr id="22" name="Isosceles Triangle 21"/>
-            <p:cNvSpPr/>
-            <p:nvPr/>
-          </p:nvSpPr>
-          <p:spPr>
-            <a:xfrm>
-              <a:off x="225195" y="2471922"/>
-              <a:ext cx="113312" cy="113312"/>
-            </a:xfrm>
-            <a:prstGeom prst="triangle">
-              <a:avLst/>
-            </a:prstGeom>
-            <a:solidFill>
-              <a:schemeClr val="bg1"/>
-            </a:solidFill>
-            <a:ln>
-              <a:solidFill>
-                <a:schemeClr val="bg1"/>
-              </a:solidFill>
-            </a:ln>
-          </p:spPr>
-          <p:style>
-            <a:lnRef idx="2">
-              <a:schemeClr val="accent1">
-                <a:shade val="50000"/>
-              </a:schemeClr>
-            </a:lnRef>
-            <a:fillRef idx="1">
-              <a:schemeClr val="accent1"/>
-            </a:fillRef>
-            <a:effectRef idx="0">
-              <a:schemeClr val="accent1"/>
-            </a:effectRef>
-            <a:fontRef idx="minor">
-              <a:schemeClr val="lt1"/>
-            </a:fontRef>
-          </p:style>
-          <p:txBody>
-            <a:bodyPr rtlCol="0" anchor="ctr"/>
-            <a:lstStyle/>
-            <a:p>
-              <a:pPr algn="ctr"/>
-              <a:endParaRPr lang="en-US"/>
-            </a:p>
-          </p:txBody>
-        </p:sp>
-        <p:sp>
-          <p:nvSpPr>
-            <p:cNvPr id="55" name="Rectangle 54"/>
-            <p:cNvSpPr/>
-            <p:nvPr/>
-          </p:nvSpPr>
-          <p:spPr>
-            <a:xfrm>
-              <a:off x="470917" y="2798585"/>
-              <a:ext cx="504000" cy="324000"/>
-            </a:xfrm>
-            <a:prstGeom prst="rect">
-              <a:avLst/>
-            </a:prstGeom>
-            <a:solidFill>
-              <a:schemeClr val="accent6"/>
-            </a:solidFill>
-            <a:ln>
-              <a:solidFill>
-                <a:schemeClr val="bg1"/>
-              </a:solidFill>
-            </a:ln>
-          </p:spPr>
-          <p:style>
-            <a:lnRef idx="2">
-              <a:schemeClr val="accent1">
-                <a:shade val="50000"/>
-              </a:schemeClr>
-            </a:lnRef>
-            <a:fillRef idx="1">
-              <a:schemeClr val="accent1"/>
-            </a:fillRef>
-            <a:effectRef idx="0">
-              <a:schemeClr val="accent1"/>
-            </a:effectRef>
-            <a:fontRef idx="minor">
-              <a:schemeClr val="lt1"/>
-            </a:fontRef>
-          </p:style>
-          <p:txBody>
-            <a:bodyPr rtlCol="0" anchor="ctr"/>
-            <a:lstStyle/>
-            <a:p>
-              <a:pPr algn="ctr"/>
-              <a:endParaRPr lang="en-US"/>
-            </a:p>
-          </p:txBody>
-        </p:sp>
-        <p:sp>
-          <p:nvSpPr>
-            <p:cNvPr id="21" name="Isosceles Triangle 20"/>
-            <p:cNvSpPr/>
-            <p:nvPr/>
-          </p:nvSpPr>
-          <p:spPr>
-            <a:xfrm>
-              <a:off x="777797" y="2932379"/>
-              <a:ext cx="113312" cy="113312"/>
-            </a:xfrm>
-            <a:prstGeom prst="triangle">
-              <a:avLst/>
-            </a:prstGeom>
-            <a:solidFill>
-              <a:schemeClr val="bg1"/>
-            </a:solidFill>
-            <a:ln>
-              <a:solidFill>
-                <a:schemeClr val="bg1"/>
-              </a:solidFill>
-            </a:ln>
-          </p:spPr>
-          <p:style>
-            <a:lnRef idx="2">
-              <a:schemeClr val="accent1">
-                <a:shade val="50000"/>
-              </a:schemeClr>
-            </a:lnRef>
-            <a:fillRef idx="1">
-              <a:schemeClr val="accent1"/>
-            </a:fillRef>
-            <a:effectRef idx="0">
-              <a:schemeClr val="accent1"/>
-            </a:effectRef>
-            <a:fontRef idx="minor">
-              <a:schemeClr val="lt1"/>
-            </a:fontRef>
-          </p:style>
-          <p:txBody>
-            <a:bodyPr rtlCol="0" anchor="ctr"/>
-            <a:lstStyle/>
-            <a:p>
-              <a:pPr algn="ctr"/>
-              <a:endParaRPr lang="en-US"/>
-            </a:p>
-          </p:txBody>
-        </p:sp>
-        <p:sp>
-          <p:nvSpPr>
-            <p:cNvPr id="43" name="Rectangle 42"/>
-            <p:cNvSpPr/>
-            <p:nvPr/>
-          </p:nvSpPr>
-          <p:spPr>
-            <a:xfrm>
-              <a:off x="152400" y="2357870"/>
-              <a:ext cx="838200" cy="838200"/>
-            </a:xfrm>
-            <a:prstGeom prst="rect">
-              <a:avLst/>
-            </a:prstGeom>
+          <a:prstGeom prst="rect">
+            <a:avLst/>
+          </a:prstGeom>
+          <a:noFill/>
+          <a:ln>
             <a:noFill/>
-            <a:ln>
-              <a:noFill/>
-            </a:ln>
-          </p:spPr>
-          <p:style>
-            <a:lnRef idx="2">
-              <a:schemeClr val="accent1">
-                <a:shade val="50000"/>
-              </a:schemeClr>
-            </a:lnRef>
-            <a:fillRef idx="1">
-              <a:schemeClr val="accent1"/>
-            </a:fillRef>
-            <a:effectRef idx="0">
-              <a:schemeClr val="accent1"/>
-            </a:effectRef>
-            <a:fontRef idx="minor">
-              <a:schemeClr val="lt1"/>
-            </a:fontRef>
-          </p:style>
-          <p:txBody>
-            <a:bodyPr rtlCol="0" anchor="ctr"/>
-            <a:lstStyle/>
-            <a:p>
-              <a:pPr algn="ctr"/>
-              <a:endParaRPr lang="en-SG"/>
-            </a:p>
-          </p:txBody>
-        </p:sp>
-        <p:sp>
-          <p:nvSpPr>
-            <p:cNvPr id="13" name="Flowchart: Connector 12"/>
-            <p:cNvSpPr>
-              <a:spLocks noChangeAspect="1"/>
-            </p:cNvSpPr>
-            <p:nvPr/>
-          </p:nvSpPr>
-          <p:spPr>
-            <a:xfrm>
-              <a:off x="697031" y="2554354"/>
-              <a:ext cx="216000" cy="216000"/>
-            </a:xfrm>
-            <a:prstGeom prst="flowChartConnector">
-              <a:avLst/>
-            </a:prstGeom>
-            <a:solidFill>
-              <a:srgbClr val="0070C0"/>
-            </a:solidFill>
-            <a:ln>
-              <a:solidFill>
-                <a:schemeClr val="bg1"/>
-              </a:solidFill>
-            </a:ln>
-          </p:spPr>
-          <p:style>
-            <a:lnRef idx="2">
-              <a:schemeClr val="accent1">
-                <a:shade val="50000"/>
-              </a:schemeClr>
-            </a:lnRef>
-            <a:fillRef idx="1">
-              <a:schemeClr val="accent1"/>
-            </a:fillRef>
-            <a:effectRef idx="0">
-              <a:schemeClr val="accent1"/>
-            </a:effectRef>
-            <a:fontRef idx="minor">
-              <a:schemeClr val="lt1"/>
-            </a:fontRef>
-          </p:style>
-          <p:txBody>
-            <a:bodyPr wrap="none" lIns="0" tIns="0" rIns="0" bIns="0" rtlCol="0" anchor="ctr"/>
-            <a:lstStyle/>
-            <a:p>
-              <a:pPr algn="ctr"/>
-              <a:endParaRPr lang="en-SG" b="1" dirty="0"/>
-            </a:p>
-          </p:txBody>
-        </p:sp>
-        <p:sp>
-          <p:nvSpPr>
-            <p:cNvPr id="14" name="Rectangle 13"/>
-            <p:cNvSpPr/>
-            <p:nvPr/>
-          </p:nvSpPr>
-          <p:spPr>
-            <a:xfrm>
-              <a:off x="654990" y="2467073"/>
-              <a:ext cx="300082" cy="369332"/>
-            </a:xfrm>
-            <a:prstGeom prst="rect">
-              <a:avLst/>
-            </a:prstGeom>
-          </p:spPr>
-          <p:txBody>
-            <a:bodyPr wrap="none">
-              <a:spAutoFit/>
-            </a:bodyPr>
-            <a:lstStyle/>
-            <a:p>
-              <a:pPr lvl="0" algn="ctr"/>
-              <a:r>
-                <a:rPr lang="en-US" b="1" dirty="0">
-                  <a:solidFill>
-                    <a:prstClr val="white"/>
-                  </a:solidFill>
-                </a:rPr>
-                <a:t>+</a:t>
-              </a:r>
-              <a:endParaRPr lang="en-SG" b="1" dirty="0">
-                <a:solidFill>
-                  <a:prstClr val="white"/>
-                </a:solidFill>
-              </a:endParaRPr>
-            </a:p>
-          </p:txBody>
-        </p:sp>
-      </p:grpSp>
-      <p:grpSp>
-        <p:nvGrpSpPr>
-          <p:cNvPr id="99" name="Group 98"/>
-          <p:cNvGrpSpPr/>
-          <p:nvPr/>
-        </p:nvGrpSpPr>
-        <p:grpSpPr>
-          <a:xfrm>
-            <a:off x="1175693" y="2361045"/>
-            <a:ext cx="838200" cy="838200"/>
-            <a:chOff x="1175693" y="2361045"/>
-            <a:chExt cx="838200" cy="838200"/>
-          </a:xfrm>
-        </p:grpSpPr>
-        <p:sp>
-          <p:nvSpPr>
-            <p:cNvPr id="66" name="Rectangle 65"/>
-            <p:cNvSpPr/>
-            <p:nvPr/>
-          </p:nvSpPr>
-          <p:spPr>
-            <a:xfrm>
-              <a:off x="1192512" y="2420505"/>
-              <a:ext cx="504000" cy="324000"/>
-            </a:xfrm>
-            <a:prstGeom prst="rect">
-              <a:avLst/>
-            </a:prstGeom>
-            <a:solidFill>
-              <a:schemeClr val="accent6"/>
-            </a:solidFill>
-            <a:ln>
-              <a:solidFill>
-                <a:schemeClr val="bg1"/>
-              </a:solidFill>
-            </a:ln>
-          </p:spPr>
-          <p:style>
-            <a:lnRef idx="2">
-              <a:schemeClr val="accent1">
-                <a:shade val="50000"/>
-              </a:schemeClr>
-            </a:lnRef>
-            <a:fillRef idx="1">
-              <a:schemeClr val="accent1"/>
-            </a:fillRef>
-            <a:effectRef idx="0">
-              <a:schemeClr val="accent1"/>
-            </a:effectRef>
-            <a:fontRef idx="minor">
-              <a:schemeClr val="lt1"/>
-            </a:fontRef>
-          </p:style>
-          <p:txBody>
-            <a:bodyPr rtlCol="0" anchor="ctr"/>
-            <a:lstStyle/>
-            <a:p>
-              <a:pPr algn="ctr"/>
-              <a:endParaRPr lang="en-US"/>
-            </a:p>
-          </p:txBody>
-        </p:sp>
-        <p:sp>
-          <p:nvSpPr>
-            <p:cNvPr id="67" name="Rectangle 66"/>
-            <p:cNvSpPr/>
-            <p:nvPr/>
-          </p:nvSpPr>
-          <p:spPr>
-            <a:xfrm rot="20725682">
-              <a:off x="1315467" y="2613246"/>
-              <a:ext cx="504000" cy="324000"/>
-            </a:xfrm>
-            <a:prstGeom prst="rect">
-              <a:avLst/>
-            </a:prstGeom>
-            <a:solidFill>
-              <a:srgbClr val="0070C0"/>
-            </a:solidFill>
-            <a:ln>
-              <a:solidFill>
-                <a:schemeClr val="bg1"/>
-              </a:solidFill>
-            </a:ln>
-          </p:spPr>
-          <p:style>
-            <a:lnRef idx="2">
-              <a:schemeClr val="accent1">
-                <a:shade val="50000"/>
-              </a:schemeClr>
-            </a:lnRef>
-            <a:fillRef idx="1">
-              <a:schemeClr val="accent1"/>
-            </a:fillRef>
-            <a:effectRef idx="0">
-              <a:schemeClr val="accent1"/>
-            </a:effectRef>
-            <a:fontRef idx="minor">
-              <a:schemeClr val="lt1"/>
-            </a:fontRef>
-          </p:style>
-          <p:txBody>
-            <a:bodyPr rtlCol="0" anchor="ctr"/>
-            <a:lstStyle/>
-            <a:p>
-              <a:pPr algn="ctr"/>
-              <a:endParaRPr lang="en-US"/>
-            </a:p>
-          </p:txBody>
-        </p:sp>
-        <p:sp>
-          <p:nvSpPr>
-            <p:cNvPr id="68" name="Isosceles Triangle 67"/>
-            <p:cNvSpPr/>
-            <p:nvPr/>
-          </p:nvSpPr>
-          <p:spPr>
-            <a:xfrm>
-              <a:off x="1248488" y="2475097"/>
-              <a:ext cx="113312" cy="113312"/>
-            </a:xfrm>
-            <a:prstGeom prst="triangle">
-              <a:avLst/>
-            </a:prstGeom>
-            <a:solidFill>
-              <a:schemeClr val="bg1"/>
-            </a:solidFill>
-            <a:ln>
-              <a:solidFill>
-                <a:schemeClr val="bg1"/>
-              </a:solidFill>
-            </a:ln>
-          </p:spPr>
-          <p:style>
-            <a:lnRef idx="2">
-              <a:schemeClr val="accent1">
-                <a:shade val="50000"/>
-              </a:schemeClr>
-            </a:lnRef>
-            <a:fillRef idx="1">
-              <a:schemeClr val="accent1"/>
-            </a:fillRef>
-            <a:effectRef idx="0">
-              <a:schemeClr val="accent1"/>
-            </a:effectRef>
-            <a:fontRef idx="minor">
-              <a:schemeClr val="lt1"/>
-            </a:fontRef>
-          </p:style>
-          <p:txBody>
-            <a:bodyPr rtlCol="0" anchor="ctr"/>
-            <a:lstStyle/>
-            <a:p>
-              <a:pPr algn="ctr"/>
-              <a:endParaRPr lang="en-US"/>
-            </a:p>
-          </p:txBody>
-        </p:sp>
-        <p:sp>
-          <p:nvSpPr>
-            <p:cNvPr id="69" name="Rectangle 68"/>
-            <p:cNvSpPr/>
-            <p:nvPr/>
-          </p:nvSpPr>
-          <p:spPr>
-            <a:xfrm>
-              <a:off x="1494210" y="2801760"/>
-              <a:ext cx="504000" cy="324000"/>
-            </a:xfrm>
-            <a:prstGeom prst="rect">
-              <a:avLst/>
-            </a:prstGeom>
-            <a:solidFill>
-              <a:schemeClr val="accent6"/>
-            </a:solidFill>
-            <a:ln>
-              <a:solidFill>
-                <a:schemeClr val="bg1"/>
-              </a:solidFill>
-            </a:ln>
-          </p:spPr>
-          <p:style>
-            <a:lnRef idx="2">
-              <a:schemeClr val="accent1">
-                <a:shade val="50000"/>
-              </a:schemeClr>
-            </a:lnRef>
-            <a:fillRef idx="1">
-              <a:schemeClr val="accent1"/>
-            </a:fillRef>
-            <a:effectRef idx="0">
-              <a:schemeClr val="accent1"/>
-            </a:effectRef>
-            <a:fontRef idx="minor">
-              <a:schemeClr val="lt1"/>
-            </a:fontRef>
-          </p:style>
-          <p:txBody>
-            <a:bodyPr rtlCol="0" anchor="ctr"/>
-            <a:lstStyle/>
-            <a:p>
-              <a:pPr algn="ctr"/>
-              <a:endParaRPr lang="en-US"/>
-            </a:p>
-          </p:txBody>
-        </p:sp>
-        <p:sp>
-          <p:nvSpPr>
-            <p:cNvPr id="70" name="Isosceles Triangle 69"/>
-            <p:cNvSpPr/>
-            <p:nvPr/>
-          </p:nvSpPr>
-          <p:spPr>
-            <a:xfrm>
-              <a:off x="1801090" y="2935554"/>
-              <a:ext cx="113312" cy="113312"/>
-            </a:xfrm>
-            <a:prstGeom prst="triangle">
-              <a:avLst/>
-            </a:prstGeom>
-            <a:solidFill>
-              <a:schemeClr val="bg1"/>
-            </a:solidFill>
-            <a:ln>
-              <a:solidFill>
-                <a:schemeClr val="bg1"/>
-              </a:solidFill>
-            </a:ln>
-          </p:spPr>
-          <p:style>
-            <a:lnRef idx="2">
-              <a:schemeClr val="accent1">
-                <a:shade val="50000"/>
-              </a:schemeClr>
-            </a:lnRef>
-            <a:fillRef idx="1">
-              <a:schemeClr val="accent1"/>
-            </a:fillRef>
-            <a:effectRef idx="0">
-              <a:schemeClr val="accent1"/>
-            </a:effectRef>
-            <a:fontRef idx="minor">
-              <a:schemeClr val="lt1"/>
-            </a:fontRef>
-          </p:style>
-          <p:txBody>
-            <a:bodyPr rtlCol="0" anchor="ctr"/>
-            <a:lstStyle/>
-            <a:p>
-              <a:pPr algn="ctr"/>
-              <a:endParaRPr lang="en-US"/>
-            </a:p>
-          </p:txBody>
-        </p:sp>
-        <p:sp>
-          <p:nvSpPr>
-            <p:cNvPr id="72" name="Rectangle 71"/>
-            <p:cNvSpPr/>
-            <p:nvPr/>
-          </p:nvSpPr>
-          <p:spPr>
-            <a:xfrm>
-              <a:off x="1175693" y="2361045"/>
-              <a:ext cx="838200" cy="838200"/>
-            </a:xfrm>
-            <a:prstGeom prst="rect">
-              <a:avLst/>
-            </a:prstGeom>
-            <a:noFill/>
-            <a:ln>
-              <a:noFill/>
-            </a:ln>
-          </p:spPr>
-          <p:style>
-            <a:lnRef idx="2">
-              <a:schemeClr val="accent1">
-                <a:shade val="50000"/>
-              </a:schemeClr>
-            </a:lnRef>
-            <a:fillRef idx="1">
-              <a:schemeClr val="accent1"/>
-            </a:fillRef>
-            <a:effectRef idx="0">
-              <a:schemeClr val="accent1"/>
-            </a:effectRef>
-            <a:fontRef idx="minor">
-              <a:schemeClr val="lt1"/>
-            </a:fontRef>
-          </p:style>
-          <p:txBody>
-            <a:bodyPr rtlCol="0" anchor="ctr"/>
-            <a:lstStyle/>
-            <a:p>
-              <a:pPr algn="ctr"/>
-              <a:endParaRPr lang="en-SG"/>
-            </a:p>
-          </p:txBody>
-        </p:sp>
-        <p:sp>
-          <p:nvSpPr>
-            <p:cNvPr id="73" name="Flowchart: Connector 72"/>
-            <p:cNvSpPr>
-              <a:spLocks noChangeAspect="1"/>
-            </p:cNvSpPr>
-            <p:nvPr/>
-          </p:nvSpPr>
-          <p:spPr>
-            <a:xfrm>
-              <a:off x="1716387" y="2557529"/>
-              <a:ext cx="216000" cy="216000"/>
-            </a:xfrm>
-            <a:prstGeom prst="flowChartConnector">
-              <a:avLst/>
-            </a:prstGeom>
-            <a:solidFill>
-              <a:schemeClr val="bg1"/>
-            </a:solidFill>
-            <a:ln>
-              <a:solidFill>
-                <a:schemeClr val="bg1"/>
-              </a:solidFill>
-            </a:ln>
-          </p:spPr>
-          <p:style>
-            <a:lnRef idx="2">
-              <a:schemeClr val="accent1">
-                <a:shade val="50000"/>
-              </a:schemeClr>
-            </a:lnRef>
-            <a:fillRef idx="1">
-              <a:schemeClr val="accent1"/>
-            </a:fillRef>
-            <a:effectRef idx="0">
-              <a:schemeClr val="accent1"/>
-            </a:effectRef>
-            <a:fontRef idx="minor">
-              <a:schemeClr val="lt1"/>
-            </a:fontRef>
-          </p:style>
-          <p:txBody>
-            <a:bodyPr wrap="none" lIns="0" tIns="0" rIns="0" bIns="0" rtlCol="0" anchor="ctr"/>
-            <a:lstStyle/>
-            <a:p>
-              <a:pPr algn="ctr"/>
-              <a:endParaRPr lang="en-SG" b="1" dirty="0"/>
-            </a:p>
-          </p:txBody>
-        </p:sp>
-        <p:sp>
-          <p:nvSpPr>
-            <p:cNvPr id="17" name="Arc 16"/>
-            <p:cNvSpPr>
-              <a:spLocks noChangeAspect="1"/>
-            </p:cNvSpPr>
-            <p:nvPr/>
-          </p:nvSpPr>
-          <p:spPr>
-            <a:xfrm>
-              <a:off x="1760432" y="2579330"/>
-              <a:ext cx="167192" cy="167192"/>
-            </a:xfrm>
-            <a:prstGeom prst="arc">
-              <a:avLst>
-                <a:gd name="adj1" fmla="val 372342"/>
-                <a:gd name="adj2" fmla="val 15865948"/>
-              </a:avLst>
-            </a:prstGeom>
-            <a:ln w="38100" cap="sq">
-              <a:solidFill>
-                <a:srgbClr val="0070C0"/>
-              </a:solidFill>
-              <a:headEnd type="none" w="med" len="med"/>
-              <a:tailEnd type="none" w="med" len="med"/>
-            </a:ln>
-          </p:spPr>
-          <p:style>
-            <a:lnRef idx="1">
-              <a:schemeClr val="accent1"/>
-            </a:lnRef>
-            <a:fillRef idx="0">
-              <a:schemeClr val="accent1"/>
-            </a:fillRef>
-            <a:effectRef idx="0">
-              <a:schemeClr val="accent1"/>
-            </a:effectRef>
-            <a:fontRef idx="minor">
-              <a:schemeClr val="tx1"/>
-            </a:fontRef>
-          </p:style>
-          <p:txBody>
-            <a:bodyPr rtlCol="0" anchor="ctr"/>
-            <a:lstStyle/>
-            <a:p>
-              <a:pPr algn="ctr"/>
-              <a:endParaRPr lang="en-SG"/>
-            </a:p>
-          </p:txBody>
-        </p:sp>
-        <p:sp>
-          <p:nvSpPr>
-            <p:cNvPr id="3" name="Isosceles Triangle 2"/>
-            <p:cNvSpPr/>
-            <p:nvPr/>
-          </p:nvSpPr>
-          <p:spPr>
-            <a:xfrm>
-              <a:off x="1870024" y="2591710"/>
-              <a:ext cx="116389" cy="76200"/>
-            </a:xfrm>
-            <a:prstGeom prst="triangle">
-              <a:avLst/>
-            </a:prstGeom>
-            <a:solidFill>
-              <a:srgbClr val="0070C0"/>
-            </a:solidFill>
-            <a:ln>
-              <a:noFill/>
-            </a:ln>
-          </p:spPr>
-          <p:style>
-            <a:lnRef idx="2">
-              <a:schemeClr val="accent1">
-                <a:shade val="50000"/>
-              </a:schemeClr>
-            </a:lnRef>
-            <a:fillRef idx="1">
-              <a:schemeClr val="accent1"/>
-            </a:fillRef>
-            <a:effectRef idx="0">
-              <a:schemeClr val="accent1"/>
-            </a:effectRef>
-            <a:fontRef idx="minor">
-              <a:schemeClr val="lt1"/>
-            </a:fontRef>
-          </p:style>
-          <p:txBody>
-            <a:bodyPr rtlCol="0" anchor="ctr"/>
-            <a:lstStyle/>
-            <a:p>
-              <a:pPr algn="ctr"/>
-              <a:endParaRPr lang="en-SG"/>
-            </a:p>
-          </p:txBody>
-        </p:sp>
-      </p:grpSp>
+          </a:ln>
+        </p:spPr>
+        <p:style>
+          <a:lnRef idx="2">
+            <a:schemeClr val="accent1">
+              <a:shade val="50000"/>
+            </a:schemeClr>
+          </a:lnRef>
+          <a:fillRef idx="1">
+            <a:schemeClr val="accent1"/>
+          </a:fillRef>
+          <a:effectRef idx="0">
+            <a:schemeClr val="accent1"/>
+          </a:effectRef>
+          <a:fontRef idx="minor">
+            <a:schemeClr val="lt1"/>
+          </a:fontRef>
+        </p:style>
+        <p:txBody>
+          <a:bodyPr rtlCol="0" anchor="ctr"/>
+          <a:lstStyle/>
+          <a:p>
+            <a:pPr algn="ctr"/>
+            <a:endParaRPr lang="en-SG"/>
+          </a:p>
+        </p:txBody>
+      </p:sp>
       <p:grpSp>
         <p:nvGrpSpPr>
           <p:cNvPr id="102" name="Group 101"/>
@@ -9608,7 +8820,7 @@
       </p:grpSp>
       <p:grpSp>
         <p:nvGrpSpPr>
-          <p:cNvPr id="105" name="Group 104"/>
+          <p:cNvPr id="11" name="Group 10"/>
           <p:cNvGrpSpPr/>
           <p:nvPr/>
         </p:nvGrpSpPr>
@@ -9667,13 +8879,15 @@
         <p:sp>
           <p:nvSpPr>
             <p:cNvPr id="9" name="Flowchart: Connector 8"/>
-            <p:cNvSpPr/>
+            <p:cNvSpPr>
+              <a:spLocks noChangeAspect="1"/>
+            </p:cNvSpPr>
             <p:nvPr/>
           </p:nvSpPr>
           <p:spPr>
             <a:xfrm>
-              <a:off x="6374393" y="2433753"/>
-              <a:ext cx="535402" cy="535402"/>
+              <a:off x="6318176" y="2438400"/>
+              <a:ext cx="647836" cy="647836"/>
             </a:xfrm>
             <a:prstGeom prst="flowChartConnector">
               <a:avLst/>
@@ -9708,7 +8922,7 @@
             <a:p>
               <a:pPr algn="ctr"/>
               <a:r>
-                <a:rPr lang="en-US" sz="4000" b="1" dirty="0" smtClean="0">
+                <a:rPr lang="en-US" sz="5400" b="1" dirty="0" smtClean="0">
                   <a:ln w="12700">
                     <a:solidFill>
                       <a:schemeClr val="bg1"/>
@@ -9721,7 +8935,7 @@
                 </a:rPr>
                 <a:t>?</a:t>
               </a:r>
-              <a:endParaRPr lang="en-SG" sz="4000" b="1" dirty="0">
+              <a:endParaRPr lang="en-SG" sz="5400" b="1" dirty="0">
                 <a:ln w="12700">
                   <a:solidFill>
                     <a:schemeClr val="bg1"/>
@@ -9738,7 +8952,7 @@
       </p:grpSp>
       <p:grpSp>
         <p:nvGrpSpPr>
-          <p:cNvPr id="106" name="Group 105"/>
+          <p:cNvPr id="20" name="Group 19"/>
           <p:cNvGrpSpPr/>
           <p:nvPr/>
         </p:nvGrpSpPr>
@@ -9797,23 +9011,21 @@
         <p:grpSp>
           <p:nvGrpSpPr>
             <p:cNvPr id="47" name="Group 46"/>
-            <p:cNvGrpSpPr/>
+            <p:cNvGrpSpPr>
+              <a:grpSpLocks noChangeAspect="1"/>
+            </p:cNvGrpSpPr>
             <p:nvPr/>
           </p:nvGrpSpPr>
           <p:grpSpPr>
             <a:xfrm>
-              <a:off x="7287423" y="2454381"/>
-              <a:ext cx="685800" cy="399170"/>
+              <a:off x="7297452" y="2436068"/>
+              <a:ext cx="692727" cy="482996"/>
               <a:chOff x="7300914" y="2545581"/>
               <a:chExt cx="685800" cy="399170"/>
             </a:xfrm>
             <a:solidFill>
               <a:schemeClr val="accent6"/>
             </a:solidFill>
-            <a:scene3d>
-              <a:camera prst="perspectiveHeroicExtremeLeftFacing"/>
-              <a:lightRig rig="threePt" dir="t"/>
-            </a:scene3d>
           </p:grpSpPr>
           <p:sp>
             <p:nvSpPr>
@@ -10030,13 +9242,15 @@
         <p:sp>
           <p:nvSpPr>
             <p:cNvPr id="48" name="Right Arrow 47"/>
-            <p:cNvSpPr/>
+            <p:cNvSpPr>
+              <a:spLocks noChangeAspect="1"/>
+            </p:cNvSpPr>
             <p:nvPr/>
           </p:nvSpPr>
           <p:spPr>
             <a:xfrm rot="18800530">
-              <a:off x="7429167" y="2787464"/>
-              <a:ext cx="290393" cy="227807"/>
+              <a:off x="7442067" y="2749761"/>
+              <a:ext cx="386513" cy="303212"/>
             </a:xfrm>
             <a:custGeom>
               <a:avLst/>
@@ -10509,13 +9723,15 @@
         <p:sp>
           <p:nvSpPr>
             <p:cNvPr id="90" name="Flowchart: Connector 89"/>
-            <p:cNvSpPr/>
+            <p:cNvSpPr>
+              <a:spLocks noChangeAspect="1"/>
+            </p:cNvSpPr>
             <p:nvPr/>
           </p:nvSpPr>
           <p:spPr>
             <a:xfrm>
-              <a:off x="8355593" y="2433753"/>
-              <a:ext cx="535402" cy="535402"/>
+              <a:off x="8299376" y="2434692"/>
+              <a:ext cx="647836" cy="647836"/>
             </a:xfrm>
             <a:prstGeom prst="flowChartConnector">
               <a:avLst/>
@@ -10550,7 +9766,7 @@
             <a:p>
               <a:pPr algn="ctr"/>
               <a:r>
-                <a:rPr lang="en-US" sz="3600" b="1" dirty="0" err="1">
+                <a:rPr lang="en-US" sz="4400" b="1" dirty="0" err="1">
                   <a:ln w="12700">
                     <a:solidFill>
                       <a:schemeClr val="bg1"/>
@@ -10563,7 +9779,7 @@
                 </a:rPr>
                 <a:t>i</a:t>
               </a:r>
-              <a:endParaRPr lang="en-SG" sz="3600" b="1" dirty="0">
+              <a:endParaRPr lang="en-SG" sz="4400" b="1" dirty="0">
                 <a:ln w="12700">
                   <a:solidFill>
                     <a:schemeClr val="bg1"/>
@@ -10964,6 +10180,848 @@
           </a:p>
         </p:txBody>
       </p:sp>
+      <p:grpSp>
+        <p:nvGrpSpPr>
+          <p:cNvPr id="7" name="Group 6"/>
+          <p:cNvGrpSpPr/>
+          <p:nvPr/>
+        </p:nvGrpSpPr>
+        <p:grpSpPr>
+          <a:xfrm>
+            <a:off x="166689" y="2357870"/>
+            <a:ext cx="838200" cy="838200"/>
+            <a:chOff x="166689" y="2357870"/>
+            <a:chExt cx="838200" cy="838200"/>
+          </a:xfrm>
+        </p:grpSpPr>
+        <p:sp>
+          <p:nvSpPr>
+            <p:cNvPr id="15" name="Rectangle 14"/>
+            <p:cNvSpPr/>
+            <p:nvPr/>
+          </p:nvSpPr>
+          <p:spPr>
+            <a:xfrm>
+              <a:off x="169219" y="2417330"/>
+              <a:ext cx="374955" cy="324000"/>
+            </a:xfrm>
+            <a:prstGeom prst="rect">
+              <a:avLst/>
+            </a:prstGeom>
+            <a:solidFill>
+              <a:schemeClr val="accent6"/>
+            </a:solidFill>
+            <a:ln>
+              <a:solidFill>
+                <a:schemeClr val="bg1"/>
+              </a:solidFill>
+            </a:ln>
+          </p:spPr>
+          <p:style>
+            <a:lnRef idx="2">
+              <a:schemeClr val="accent1">
+                <a:shade val="50000"/>
+              </a:schemeClr>
+            </a:lnRef>
+            <a:fillRef idx="1">
+              <a:schemeClr val="accent1"/>
+            </a:fillRef>
+            <a:effectRef idx="0">
+              <a:schemeClr val="accent1"/>
+            </a:effectRef>
+            <a:fontRef idx="minor">
+              <a:schemeClr val="lt1"/>
+            </a:fontRef>
+          </p:style>
+          <p:txBody>
+            <a:bodyPr rtlCol="0" anchor="ctr"/>
+            <a:lstStyle/>
+            <a:p>
+              <a:pPr algn="ctr"/>
+              <a:endParaRPr lang="en-US"/>
+            </a:p>
+          </p:txBody>
+        </p:sp>
+        <p:sp>
+          <p:nvSpPr>
+            <p:cNvPr id="16" name="Rectangle 15"/>
+            <p:cNvSpPr/>
+            <p:nvPr/>
+          </p:nvSpPr>
+          <p:spPr>
+            <a:xfrm rot="19712449">
+              <a:off x="292174" y="2610071"/>
+              <a:ext cx="504000" cy="324000"/>
+            </a:xfrm>
+            <a:prstGeom prst="rect">
+              <a:avLst/>
+            </a:prstGeom>
+            <a:solidFill>
+              <a:srgbClr val="0070C0"/>
+            </a:solidFill>
+            <a:ln>
+              <a:solidFill>
+                <a:schemeClr val="bg1"/>
+              </a:solidFill>
+            </a:ln>
+          </p:spPr>
+          <p:style>
+            <a:lnRef idx="2">
+              <a:schemeClr val="accent1">
+                <a:shade val="50000"/>
+              </a:schemeClr>
+            </a:lnRef>
+            <a:fillRef idx="1">
+              <a:schemeClr val="accent1"/>
+            </a:fillRef>
+            <a:effectRef idx="0">
+              <a:schemeClr val="accent1"/>
+            </a:effectRef>
+            <a:fontRef idx="minor">
+              <a:schemeClr val="lt1"/>
+            </a:fontRef>
+          </p:style>
+          <p:txBody>
+            <a:bodyPr rtlCol="0" anchor="ctr"/>
+            <a:lstStyle/>
+            <a:p>
+              <a:pPr algn="ctr"/>
+              <a:endParaRPr lang="en-US"/>
+            </a:p>
+          </p:txBody>
+        </p:sp>
+        <p:sp>
+          <p:nvSpPr>
+            <p:cNvPr id="22" name="Isosceles Triangle 21"/>
+            <p:cNvSpPr/>
+            <p:nvPr/>
+          </p:nvSpPr>
+          <p:spPr>
+            <a:xfrm>
+              <a:off x="225195" y="2471922"/>
+              <a:ext cx="113312" cy="113312"/>
+            </a:xfrm>
+            <a:prstGeom prst="triangle">
+              <a:avLst/>
+            </a:prstGeom>
+            <a:solidFill>
+              <a:schemeClr val="bg1"/>
+            </a:solidFill>
+            <a:ln>
+              <a:solidFill>
+                <a:schemeClr val="bg1"/>
+              </a:solidFill>
+            </a:ln>
+          </p:spPr>
+          <p:style>
+            <a:lnRef idx="2">
+              <a:schemeClr val="accent1">
+                <a:shade val="50000"/>
+              </a:schemeClr>
+            </a:lnRef>
+            <a:fillRef idx="1">
+              <a:schemeClr val="accent1"/>
+            </a:fillRef>
+            <a:effectRef idx="0">
+              <a:schemeClr val="accent1"/>
+            </a:effectRef>
+            <a:fontRef idx="minor">
+              <a:schemeClr val="lt1"/>
+            </a:fontRef>
+          </p:style>
+          <p:txBody>
+            <a:bodyPr rtlCol="0" anchor="ctr"/>
+            <a:lstStyle/>
+            <a:p>
+              <a:pPr algn="ctr"/>
+              <a:endParaRPr lang="en-US"/>
+            </a:p>
+          </p:txBody>
+        </p:sp>
+        <p:sp>
+          <p:nvSpPr>
+            <p:cNvPr id="55" name="Rectangle 54"/>
+            <p:cNvSpPr/>
+            <p:nvPr/>
+          </p:nvSpPr>
+          <p:spPr>
+            <a:xfrm>
+              <a:off x="470917" y="2798585"/>
+              <a:ext cx="504000" cy="324000"/>
+            </a:xfrm>
+            <a:prstGeom prst="rect">
+              <a:avLst/>
+            </a:prstGeom>
+            <a:solidFill>
+              <a:schemeClr val="accent6"/>
+            </a:solidFill>
+            <a:ln>
+              <a:solidFill>
+                <a:schemeClr val="bg1"/>
+              </a:solidFill>
+            </a:ln>
+          </p:spPr>
+          <p:style>
+            <a:lnRef idx="2">
+              <a:schemeClr val="accent1">
+                <a:shade val="50000"/>
+              </a:schemeClr>
+            </a:lnRef>
+            <a:fillRef idx="1">
+              <a:schemeClr val="accent1"/>
+            </a:fillRef>
+            <a:effectRef idx="0">
+              <a:schemeClr val="accent1"/>
+            </a:effectRef>
+            <a:fontRef idx="minor">
+              <a:schemeClr val="lt1"/>
+            </a:fontRef>
+          </p:style>
+          <p:txBody>
+            <a:bodyPr rtlCol="0" anchor="ctr"/>
+            <a:lstStyle/>
+            <a:p>
+              <a:pPr algn="ctr"/>
+              <a:endParaRPr lang="en-US"/>
+            </a:p>
+          </p:txBody>
+        </p:sp>
+        <p:sp>
+          <p:nvSpPr>
+            <p:cNvPr id="21" name="Isosceles Triangle 20"/>
+            <p:cNvSpPr/>
+            <p:nvPr/>
+          </p:nvSpPr>
+          <p:spPr>
+            <a:xfrm>
+              <a:off x="777797" y="2932379"/>
+              <a:ext cx="113312" cy="113312"/>
+            </a:xfrm>
+            <a:prstGeom prst="triangle">
+              <a:avLst/>
+            </a:prstGeom>
+            <a:solidFill>
+              <a:schemeClr val="bg1"/>
+            </a:solidFill>
+            <a:ln>
+              <a:solidFill>
+                <a:schemeClr val="bg1"/>
+              </a:solidFill>
+            </a:ln>
+          </p:spPr>
+          <p:style>
+            <a:lnRef idx="2">
+              <a:schemeClr val="accent1">
+                <a:shade val="50000"/>
+              </a:schemeClr>
+            </a:lnRef>
+            <a:fillRef idx="1">
+              <a:schemeClr val="accent1"/>
+            </a:fillRef>
+            <a:effectRef idx="0">
+              <a:schemeClr val="accent1"/>
+            </a:effectRef>
+            <a:fontRef idx="minor">
+              <a:schemeClr val="lt1"/>
+            </a:fontRef>
+          </p:style>
+          <p:txBody>
+            <a:bodyPr rtlCol="0" anchor="ctr"/>
+            <a:lstStyle/>
+            <a:p>
+              <a:pPr algn="ctr"/>
+              <a:endParaRPr lang="en-US"/>
+            </a:p>
+          </p:txBody>
+        </p:sp>
+        <p:sp>
+          <p:nvSpPr>
+            <p:cNvPr id="43" name="Rectangle 42"/>
+            <p:cNvSpPr/>
+            <p:nvPr/>
+          </p:nvSpPr>
+          <p:spPr>
+            <a:xfrm>
+              <a:off x="166689" y="2357870"/>
+              <a:ext cx="838200" cy="838200"/>
+            </a:xfrm>
+            <a:prstGeom prst="rect">
+              <a:avLst/>
+            </a:prstGeom>
+            <a:noFill/>
+            <a:ln>
+              <a:noFill/>
+            </a:ln>
+          </p:spPr>
+          <p:style>
+            <a:lnRef idx="2">
+              <a:schemeClr val="accent1">
+                <a:shade val="50000"/>
+              </a:schemeClr>
+            </a:lnRef>
+            <a:fillRef idx="1">
+              <a:schemeClr val="accent1"/>
+            </a:fillRef>
+            <a:effectRef idx="0">
+              <a:schemeClr val="accent1"/>
+            </a:effectRef>
+            <a:fontRef idx="minor">
+              <a:schemeClr val="lt1"/>
+            </a:fontRef>
+          </p:style>
+          <p:txBody>
+            <a:bodyPr rtlCol="0" anchor="ctr"/>
+            <a:lstStyle/>
+            <a:p>
+              <a:pPr algn="ctr"/>
+              <a:endParaRPr lang="en-SG"/>
+            </a:p>
+          </p:txBody>
+        </p:sp>
+        <p:sp>
+          <p:nvSpPr>
+            <p:cNvPr id="13" name="Flowchart: Connector 12"/>
+            <p:cNvSpPr>
+              <a:spLocks noChangeAspect="1"/>
+            </p:cNvSpPr>
+            <p:nvPr/>
+          </p:nvSpPr>
+          <p:spPr>
+            <a:xfrm>
+              <a:off x="575517" y="2362200"/>
+              <a:ext cx="420924" cy="420924"/>
+            </a:xfrm>
+            <a:prstGeom prst="flowChartConnector">
+              <a:avLst/>
+            </a:prstGeom>
+            <a:solidFill>
+              <a:srgbClr val="0070C0"/>
+            </a:solidFill>
+            <a:ln>
+              <a:solidFill>
+                <a:schemeClr val="bg1"/>
+              </a:solidFill>
+            </a:ln>
+          </p:spPr>
+          <p:style>
+            <a:lnRef idx="2">
+              <a:schemeClr val="accent1">
+                <a:shade val="50000"/>
+              </a:schemeClr>
+            </a:lnRef>
+            <a:fillRef idx="1">
+              <a:schemeClr val="accent1"/>
+            </a:fillRef>
+            <a:effectRef idx="0">
+              <a:schemeClr val="accent1"/>
+            </a:effectRef>
+            <a:fontRef idx="minor">
+              <a:schemeClr val="lt1"/>
+            </a:fontRef>
+          </p:style>
+          <p:txBody>
+            <a:bodyPr wrap="none" lIns="0" tIns="0" rIns="0" bIns="0" rtlCol="0" anchor="ctr"/>
+            <a:lstStyle/>
+            <a:p>
+              <a:pPr algn="ctr"/>
+              <a:endParaRPr lang="en-SG" b="1" dirty="0"/>
+            </a:p>
+          </p:txBody>
+        </p:sp>
+        <p:sp>
+          <p:nvSpPr>
+            <p:cNvPr id="2" name="Plus 1"/>
+            <p:cNvSpPr>
+              <a:spLocks noChangeAspect="1"/>
+            </p:cNvSpPr>
+            <p:nvPr/>
+          </p:nvSpPr>
+          <p:spPr>
+            <a:xfrm>
+              <a:off x="633519" y="2422994"/>
+              <a:ext cx="304920" cy="304920"/>
+            </a:xfrm>
+            <a:prstGeom prst="mathPlus">
+              <a:avLst/>
+            </a:prstGeom>
+            <a:solidFill>
+              <a:schemeClr val="bg1"/>
+            </a:solidFill>
+            <a:ln>
+              <a:noFill/>
+            </a:ln>
+          </p:spPr>
+          <p:style>
+            <a:lnRef idx="2">
+              <a:schemeClr val="accent1">
+                <a:shade val="50000"/>
+              </a:schemeClr>
+            </a:lnRef>
+            <a:fillRef idx="1">
+              <a:schemeClr val="accent1"/>
+            </a:fillRef>
+            <a:effectRef idx="0">
+              <a:schemeClr val="accent1"/>
+            </a:effectRef>
+            <a:fontRef idx="minor">
+              <a:schemeClr val="lt1"/>
+            </a:fontRef>
+          </p:style>
+          <p:txBody>
+            <a:bodyPr rtlCol="0" anchor="ctr"/>
+            <a:lstStyle/>
+            <a:p>
+              <a:pPr algn="ctr"/>
+              <a:endParaRPr lang="en-US"/>
+            </a:p>
+          </p:txBody>
+        </p:sp>
+      </p:grpSp>
+      <p:grpSp>
+        <p:nvGrpSpPr>
+          <p:cNvPr id="8" name="Group 7"/>
+          <p:cNvGrpSpPr/>
+          <p:nvPr/>
+        </p:nvGrpSpPr>
+        <p:grpSpPr>
+          <a:xfrm>
+            <a:off x="1250074" y="2362200"/>
+            <a:ext cx="838200" cy="838200"/>
+            <a:chOff x="1250074" y="2362200"/>
+            <a:chExt cx="838200" cy="838200"/>
+          </a:xfrm>
+        </p:grpSpPr>
+        <p:sp>
+          <p:nvSpPr>
+            <p:cNvPr id="76" name="Rectangle 75"/>
+            <p:cNvSpPr/>
+            <p:nvPr/>
+          </p:nvSpPr>
+          <p:spPr>
+            <a:xfrm>
+              <a:off x="1252604" y="2421660"/>
+              <a:ext cx="374955" cy="324000"/>
+            </a:xfrm>
+            <a:prstGeom prst="rect">
+              <a:avLst/>
+            </a:prstGeom>
+            <a:solidFill>
+              <a:schemeClr val="accent6"/>
+            </a:solidFill>
+            <a:ln>
+              <a:solidFill>
+                <a:schemeClr val="bg1"/>
+              </a:solidFill>
+            </a:ln>
+          </p:spPr>
+          <p:style>
+            <a:lnRef idx="2">
+              <a:schemeClr val="accent1">
+                <a:shade val="50000"/>
+              </a:schemeClr>
+            </a:lnRef>
+            <a:fillRef idx="1">
+              <a:schemeClr val="accent1"/>
+            </a:fillRef>
+            <a:effectRef idx="0">
+              <a:schemeClr val="accent1"/>
+            </a:effectRef>
+            <a:fontRef idx="minor">
+              <a:schemeClr val="lt1"/>
+            </a:fontRef>
+          </p:style>
+          <p:txBody>
+            <a:bodyPr rtlCol="0" anchor="ctr"/>
+            <a:lstStyle/>
+            <a:p>
+              <a:pPr algn="ctr"/>
+              <a:endParaRPr lang="en-US"/>
+            </a:p>
+          </p:txBody>
+        </p:sp>
+        <p:sp>
+          <p:nvSpPr>
+            <p:cNvPr id="77" name="Rectangle 76"/>
+            <p:cNvSpPr/>
+            <p:nvPr/>
+          </p:nvSpPr>
+          <p:spPr>
+            <a:xfrm rot="19712449">
+              <a:off x="1375559" y="2614401"/>
+              <a:ext cx="504000" cy="324000"/>
+            </a:xfrm>
+            <a:prstGeom prst="rect">
+              <a:avLst/>
+            </a:prstGeom>
+            <a:solidFill>
+              <a:srgbClr val="0070C0"/>
+            </a:solidFill>
+            <a:ln>
+              <a:solidFill>
+                <a:schemeClr val="bg1"/>
+              </a:solidFill>
+            </a:ln>
+          </p:spPr>
+          <p:style>
+            <a:lnRef idx="2">
+              <a:schemeClr val="accent1">
+                <a:shade val="50000"/>
+              </a:schemeClr>
+            </a:lnRef>
+            <a:fillRef idx="1">
+              <a:schemeClr val="accent1"/>
+            </a:fillRef>
+            <a:effectRef idx="0">
+              <a:schemeClr val="accent1"/>
+            </a:effectRef>
+            <a:fontRef idx="minor">
+              <a:schemeClr val="lt1"/>
+            </a:fontRef>
+          </p:style>
+          <p:txBody>
+            <a:bodyPr rtlCol="0" anchor="ctr"/>
+            <a:lstStyle/>
+            <a:p>
+              <a:pPr algn="ctr"/>
+              <a:endParaRPr lang="en-US"/>
+            </a:p>
+          </p:txBody>
+        </p:sp>
+        <p:sp>
+          <p:nvSpPr>
+            <p:cNvPr id="78" name="Isosceles Triangle 77"/>
+            <p:cNvSpPr/>
+            <p:nvPr/>
+          </p:nvSpPr>
+          <p:spPr>
+            <a:xfrm>
+              <a:off x="1308580" y="2476252"/>
+              <a:ext cx="113312" cy="113312"/>
+            </a:xfrm>
+            <a:prstGeom prst="triangle">
+              <a:avLst/>
+            </a:prstGeom>
+            <a:solidFill>
+              <a:schemeClr val="bg1"/>
+            </a:solidFill>
+            <a:ln>
+              <a:solidFill>
+                <a:schemeClr val="bg1"/>
+              </a:solidFill>
+            </a:ln>
+          </p:spPr>
+          <p:style>
+            <a:lnRef idx="2">
+              <a:schemeClr val="accent1">
+                <a:shade val="50000"/>
+              </a:schemeClr>
+            </a:lnRef>
+            <a:fillRef idx="1">
+              <a:schemeClr val="accent1"/>
+            </a:fillRef>
+            <a:effectRef idx="0">
+              <a:schemeClr val="accent1"/>
+            </a:effectRef>
+            <a:fontRef idx="minor">
+              <a:schemeClr val="lt1"/>
+            </a:fontRef>
+          </p:style>
+          <p:txBody>
+            <a:bodyPr rtlCol="0" anchor="ctr"/>
+            <a:lstStyle/>
+            <a:p>
+              <a:pPr algn="ctr"/>
+              <a:endParaRPr lang="en-US"/>
+            </a:p>
+          </p:txBody>
+        </p:sp>
+        <p:sp>
+          <p:nvSpPr>
+            <p:cNvPr id="79" name="Rectangle 78"/>
+            <p:cNvSpPr/>
+            <p:nvPr/>
+          </p:nvSpPr>
+          <p:spPr>
+            <a:xfrm>
+              <a:off x="1554302" y="2802915"/>
+              <a:ext cx="504000" cy="324000"/>
+            </a:xfrm>
+            <a:prstGeom prst="rect">
+              <a:avLst/>
+            </a:prstGeom>
+            <a:solidFill>
+              <a:schemeClr val="accent6"/>
+            </a:solidFill>
+            <a:ln>
+              <a:solidFill>
+                <a:schemeClr val="bg1"/>
+              </a:solidFill>
+            </a:ln>
+          </p:spPr>
+          <p:style>
+            <a:lnRef idx="2">
+              <a:schemeClr val="accent1">
+                <a:shade val="50000"/>
+              </a:schemeClr>
+            </a:lnRef>
+            <a:fillRef idx="1">
+              <a:schemeClr val="accent1"/>
+            </a:fillRef>
+            <a:effectRef idx="0">
+              <a:schemeClr val="accent1"/>
+            </a:effectRef>
+            <a:fontRef idx="minor">
+              <a:schemeClr val="lt1"/>
+            </a:fontRef>
+          </p:style>
+          <p:txBody>
+            <a:bodyPr rtlCol="0" anchor="ctr"/>
+            <a:lstStyle/>
+            <a:p>
+              <a:pPr algn="ctr"/>
+              <a:endParaRPr lang="en-US"/>
+            </a:p>
+          </p:txBody>
+        </p:sp>
+        <p:sp>
+          <p:nvSpPr>
+            <p:cNvPr id="80" name="Isosceles Triangle 79"/>
+            <p:cNvSpPr/>
+            <p:nvPr/>
+          </p:nvSpPr>
+          <p:spPr>
+            <a:xfrm>
+              <a:off x="1861182" y="2936709"/>
+              <a:ext cx="113312" cy="113312"/>
+            </a:xfrm>
+            <a:prstGeom prst="triangle">
+              <a:avLst/>
+            </a:prstGeom>
+            <a:solidFill>
+              <a:schemeClr val="bg1"/>
+            </a:solidFill>
+            <a:ln>
+              <a:solidFill>
+                <a:schemeClr val="bg1"/>
+              </a:solidFill>
+            </a:ln>
+          </p:spPr>
+          <p:style>
+            <a:lnRef idx="2">
+              <a:schemeClr val="accent1">
+                <a:shade val="50000"/>
+              </a:schemeClr>
+            </a:lnRef>
+            <a:fillRef idx="1">
+              <a:schemeClr val="accent1"/>
+            </a:fillRef>
+            <a:effectRef idx="0">
+              <a:schemeClr val="accent1"/>
+            </a:effectRef>
+            <a:fontRef idx="minor">
+              <a:schemeClr val="lt1"/>
+            </a:fontRef>
+          </p:style>
+          <p:txBody>
+            <a:bodyPr rtlCol="0" anchor="ctr"/>
+            <a:lstStyle/>
+            <a:p>
+              <a:pPr algn="ctr"/>
+              <a:endParaRPr lang="en-US"/>
+            </a:p>
+          </p:txBody>
+        </p:sp>
+        <p:sp>
+          <p:nvSpPr>
+            <p:cNvPr id="81" name="Rectangle 80"/>
+            <p:cNvSpPr/>
+            <p:nvPr/>
+          </p:nvSpPr>
+          <p:spPr>
+            <a:xfrm>
+              <a:off x="1250074" y="2362200"/>
+              <a:ext cx="838200" cy="838200"/>
+            </a:xfrm>
+            <a:prstGeom prst="rect">
+              <a:avLst/>
+            </a:prstGeom>
+            <a:noFill/>
+            <a:ln>
+              <a:noFill/>
+            </a:ln>
+          </p:spPr>
+          <p:style>
+            <a:lnRef idx="2">
+              <a:schemeClr val="accent1">
+                <a:shade val="50000"/>
+              </a:schemeClr>
+            </a:lnRef>
+            <a:fillRef idx="1">
+              <a:schemeClr val="accent1"/>
+            </a:fillRef>
+            <a:effectRef idx="0">
+              <a:schemeClr val="accent1"/>
+            </a:effectRef>
+            <a:fontRef idx="minor">
+              <a:schemeClr val="lt1"/>
+            </a:fontRef>
+          </p:style>
+          <p:txBody>
+            <a:bodyPr rtlCol="0" anchor="ctr"/>
+            <a:lstStyle/>
+            <a:p>
+              <a:pPr algn="ctr"/>
+              <a:endParaRPr lang="en-SG"/>
+            </a:p>
+          </p:txBody>
+        </p:sp>
+        <p:sp>
+          <p:nvSpPr>
+            <p:cNvPr id="82" name="Flowchart: Connector 81"/>
+            <p:cNvSpPr>
+              <a:spLocks noChangeAspect="1"/>
+            </p:cNvSpPr>
+            <p:nvPr/>
+          </p:nvSpPr>
+          <p:spPr>
+            <a:xfrm>
+              <a:off x="1658902" y="2366530"/>
+              <a:ext cx="420924" cy="420924"/>
+            </a:xfrm>
+            <a:prstGeom prst="flowChartConnector">
+              <a:avLst/>
+            </a:prstGeom>
+            <a:solidFill>
+              <a:schemeClr val="bg1"/>
+            </a:solidFill>
+            <a:ln>
+              <a:solidFill>
+                <a:schemeClr val="bg1"/>
+              </a:solidFill>
+            </a:ln>
+          </p:spPr>
+          <p:style>
+            <a:lnRef idx="2">
+              <a:schemeClr val="accent1">
+                <a:shade val="50000"/>
+              </a:schemeClr>
+            </a:lnRef>
+            <a:fillRef idx="1">
+              <a:schemeClr val="accent1"/>
+            </a:fillRef>
+            <a:effectRef idx="0">
+              <a:schemeClr val="accent1"/>
+            </a:effectRef>
+            <a:fontRef idx="minor">
+              <a:schemeClr val="lt1"/>
+            </a:fontRef>
+          </p:style>
+          <p:txBody>
+            <a:bodyPr wrap="none" lIns="0" tIns="0" rIns="0" bIns="0" rtlCol="0" anchor="ctr"/>
+            <a:lstStyle/>
+            <a:p>
+              <a:pPr algn="ctr"/>
+              <a:endParaRPr lang="en-SG" b="1" dirty="0"/>
+            </a:p>
+          </p:txBody>
+        </p:sp>
+        <p:sp>
+          <p:nvSpPr>
+            <p:cNvPr id="17" name="Arc 16"/>
+            <p:cNvSpPr>
+              <a:spLocks noChangeAspect="1"/>
+            </p:cNvSpPr>
+            <p:nvPr/>
+          </p:nvSpPr>
+          <p:spPr>
+            <a:xfrm>
+              <a:off x="1718359" y="2460398"/>
+              <a:ext cx="269264" cy="269264"/>
+            </a:xfrm>
+            <a:prstGeom prst="arc">
+              <a:avLst>
+                <a:gd name="adj1" fmla="val 372342"/>
+                <a:gd name="adj2" fmla="val 16582742"/>
+              </a:avLst>
+            </a:prstGeom>
+            <a:ln w="76200" cap="sq">
+              <a:solidFill>
+                <a:srgbClr val="0070C0"/>
+              </a:solidFill>
+              <a:headEnd type="none" w="med" len="med"/>
+              <a:tailEnd type="none" w="med" len="med"/>
+            </a:ln>
+          </p:spPr>
+          <p:style>
+            <a:lnRef idx="1">
+              <a:schemeClr val="accent1"/>
+            </a:lnRef>
+            <a:fillRef idx="0">
+              <a:schemeClr val="accent1"/>
+            </a:fillRef>
+            <a:effectRef idx="0">
+              <a:schemeClr val="accent1"/>
+            </a:effectRef>
+            <a:fontRef idx="minor">
+              <a:schemeClr val="tx1"/>
+            </a:fontRef>
+          </p:style>
+          <p:txBody>
+            <a:bodyPr rtlCol="0" anchor="ctr"/>
+            <a:lstStyle/>
+            <a:p>
+              <a:pPr algn="ctr"/>
+              <a:endParaRPr lang="en-SG"/>
+            </a:p>
+          </p:txBody>
+        </p:sp>
+        <p:sp>
+          <p:nvSpPr>
+            <p:cNvPr id="3" name="Isosceles Triangle 2"/>
+            <p:cNvSpPr/>
+            <p:nvPr/>
+          </p:nvSpPr>
+          <p:spPr>
+            <a:xfrm>
+              <a:off x="1884373" y="2508774"/>
+              <a:ext cx="187446" cy="111564"/>
+            </a:xfrm>
+            <a:prstGeom prst="triangle">
+              <a:avLst/>
+            </a:prstGeom>
+            <a:solidFill>
+              <a:srgbClr val="0070C0"/>
+            </a:solidFill>
+            <a:ln>
+              <a:noFill/>
+            </a:ln>
+          </p:spPr>
+          <p:style>
+            <a:lnRef idx="2">
+              <a:schemeClr val="accent1">
+                <a:shade val="50000"/>
+              </a:schemeClr>
+            </a:lnRef>
+            <a:fillRef idx="1">
+              <a:schemeClr val="accent1"/>
+            </a:fillRef>
+            <a:effectRef idx="0">
+              <a:schemeClr val="accent1"/>
+            </a:effectRef>
+            <a:fontRef idx="minor">
+              <a:schemeClr val="lt1"/>
+            </a:fontRef>
+          </p:style>
+          <p:txBody>
+            <a:bodyPr rtlCol="0" anchor="ctr"/>
+            <a:lstStyle/>
+            <a:p>
+              <a:pPr algn="ctr"/>
+              <a:endParaRPr lang="en-SG"/>
+            </a:p>
+          </p:txBody>
+        </p:sp>
+      </p:grpSp>
     </p:spTree>
     <p:extLst>
       <p:ext uri="{BB962C8B-B14F-4D97-AF65-F5344CB8AC3E}">

</xml_diff>